<commit_message>
diagrams changed i guess?
</commit_message>
<xml_diff>
--- a/diagrams.pptx
+++ b/diagrams.pptx
@@ -4401,36 +4401,6 @@
           <a:lstStyle/>
           <a:p>
             <a:pPr algn="ctr"/>
-            <a:endParaRPr lang="en-US" sz="1000" dirty="0"/>
-          </a:p>
-        </p:txBody>
-      </p:sp>
-      <p:sp>
-        <p:nvSpPr>
-          <p:cNvPr id="84" name="TextBox 83"/>
-          <p:cNvSpPr txBox="1"/>
-          <p:nvPr/>
-        </p:nvSpPr>
-        <p:spPr>
-          <a:xfrm>
-            <a:off x="6096000" y="3205778"/>
-            <a:ext cx="826770" cy="707886"/>
-          </a:xfrm>
-          <a:prstGeom prst="rect">
-            <a:avLst/>
-          </a:prstGeom>
-          <a:noFill/>
-        </p:spPr>
-        <p:txBody>
-          <a:bodyPr wrap="square" rtlCol="0">
-            <a:spAutoFit/>
-          </a:bodyPr>
-          <a:lstStyle/>
-          <a:p>
-            <a:r>
-              <a:rPr lang="en-US" sz="1000" dirty="0" smtClean="0"/>
-              <a:t>Possible values for each feature</a:t>
-            </a:r>
             <a:endParaRPr lang="en-US" sz="1000" dirty="0"/>
           </a:p>
         </p:txBody>

</xml_diff>